<commit_message>
Started Northwood and Temple of Gond.
</commit_message>
<xml_diff>
--- a/My Multiverse/The Jaws of Time.pptx
+++ b/My Multiverse/The Jaws of Time.pptx
@@ -15,7 +15,11 @@
     <p:sldId id="307" r:id="rId9"/>
     <p:sldId id="322" r:id="rId10"/>
     <p:sldId id="324" r:id="rId11"/>
-    <p:sldId id="320" r:id="rId12"/>
+    <p:sldId id="325" r:id="rId12"/>
+    <p:sldId id="326" r:id="rId13"/>
+    <p:sldId id="327" r:id="rId14"/>
+    <p:sldId id="328" r:id="rId15"/>
+    <p:sldId id="320" r:id="rId16"/>
   </p:sldIdLst>
   <p:sldSz cx="7772400" cy="10058400"/>
   <p:notesSz cx="6858000" cy="9144000"/>
@@ -253,7 +257,7 @@
           <a:p>
             <a:fld id="{05FE7FBA-F4D8-4820-972B-6B84E9A3DAEA}" type="datetimeFigureOut">
               <a:rPr lang="en-US" smtClean="0"/>
-              <a:t>5/6/2021</a:t>
+              <a:t>5/9/2021</a:t>
             </a:fld>
             <a:endParaRPr lang="en-US"/>
           </a:p>
@@ -423,7 +427,7 @@
           <a:p>
             <a:fld id="{05FE7FBA-F4D8-4820-972B-6B84E9A3DAEA}" type="datetimeFigureOut">
               <a:rPr lang="en-US" smtClean="0"/>
-              <a:t>5/6/2021</a:t>
+              <a:t>5/9/2021</a:t>
             </a:fld>
             <a:endParaRPr lang="en-US"/>
           </a:p>
@@ -603,7 +607,7 @@
           <a:p>
             <a:fld id="{05FE7FBA-F4D8-4820-972B-6B84E9A3DAEA}" type="datetimeFigureOut">
               <a:rPr lang="en-US" smtClean="0"/>
-              <a:t>5/6/2021</a:t>
+              <a:t>5/9/2021</a:t>
             </a:fld>
             <a:endParaRPr lang="en-US"/>
           </a:p>
@@ -773,7 +777,7 @@
           <a:p>
             <a:fld id="{05FE7FBA-F4D8-4820-972B-6B84E9A3DAEA}" type="datetimeFigureOut">
               <a:rPr lang="en-US" smtClean="0"/>
-              <a:t>5/6/2021</a:t>
+              <a:t>5/9/2021</a:t>
             </a:fld>
             <a:endParaRPr lang="en-US"/>
           </a:p>
@@ -1017,7 +1021,7 @@
           <a:p>
             <a:fld id="{05FE7FBA-F4D8-4820-972B-6B84E9A3DAEA}" type="datetimeFigureOut">
               <a:rPr lang="en-US" smtClean="0"/>
-              <a:t>5/6/2021</a:t>
+              <a:t>5/9/2021</a:t>
             </a:fld>
             <a:endParaRPr lang="en-US"/>
           </a:p>
@@ -1249,7 +1253,7 @@
           <a:p>
             <a:fld id="{05FE7FBA-F4D8-4820-972B-6B84E9A3DAEA}" type="datetimeFigureOut">
               <a:rPr lang="en-US" smtClean="0"/>
-              <a:t>5/6/2021</a:t>
+              <a:t>5/9/2021</a:t>
             </a:fld>
             <a:endParaRPr lang="en-US"/>
           </a:p>
@@ -1616,7 +1620,7 @@
           <a:p>
             <a:fld id="{05FE7FBA-F4D8-4820-972B-6B84E9A3DAEA}" type="datetimeFigureOut">
               <a:rPr lang="en-US" smtClean="0"/>
-              <a:t>5/6/2021</a:t>
+              <a:t>5/9/2021</a:t>
             </a:fld>
             <a:endParaRPr lang="en-US"/>
           </a:p>
@@ -1734,7 +1738,7 @@
           <a:p>
             <a:fld id="{05FE7FBA-F4D8-4820-972B-6B84E9A3DAEA}" type="datetimeFigureOut">
               <a:rPr lang="en-US" smtClean="0"/>
-              <a:t>5/6/2021</a:t>
+              <a:t>5/9/2021</a:t>
             </a:fld>
             <a:endParaRPr lang="en-US"/>
           </a:p>
@@ -1829,7 +1833,7 @@
           <a:p>
             <a:fld id="{05FE7FBA-F4D8-4820-972B-6B84E9A3DAEA}" type="datetimeFigureOut">
               <a:rPr lang="en-US" smtClean="0"/>
-              <a:t>5/6/2021</a:t>
+              <a:t>5/9/2021</a:t>
             </a:fld>
             <a:endParaRPr lang="en-US"/>
           </a:p>
@@ -2106,7 +2110,7 @@
           <a:p>
             <a:fld id="{05FE7FBA-F4D8-4820-972B-6B84E9A3DAEA}" type="datetimeFigureOut">
               <a:rPr lang="en-US" smtClean="0"/>
-              <a:t>5/6/2021</a:t>
+              <a:t>5/9/2021</a:t>
             </a:fld>
             <a:endParaRPr lang="en-US"/>
           </a:p>
@@ -2362,7 +2366,7 @@
           <a:p>
             <a:fld id="{05FE7FBA-F4D8-4820-972B-6B84E9A3DAEA}" type="datetimeFigureOut">
               <a:rPr lang="en-US" smtClean="0"/>
-              <a:t>5/6/2021</a:t>
+              <a:t>5/9/2021</a:t>
             </a:fld>
             <a:endParaRPr lang="en-US"/>
           </a:p>
@@ -2580,7 +2584,7 @@
           <a:p>
             <a:fld id="{05FE7FBA-F4D8-4820-972B-6B84E9A3DAEA}" type="datetimeFigureOut">
               <a:rPr lang="en-US" smtClean="0"/>
-              <a:t>5/6/2021</a:t>
+              <a:t>5/9/2021</a:t>
             </a:fld>
             <a:endParaRPr lang="en-US"/>
           </a:p>
@@ -3204,6 +3208,978 @@
           <a:lstStyle/>
           <a:p>
             <a:r>
+              <a:rPr lang="en-US" sz="4400">
+                <a:latin typeface="Papyrus" panose="03070502060502030205" pitchFamily="66" charset="0"/>
+              </a:rPr>
+              <a:t>Northwood</a:t>
+            </a:r>
+            <a:endParaRPr lang="en-US" sz="4400" dirty="0">
+              <a:latin typeface="Papyrus" panose="03070502060502030205" pitchFamily="66" charset="0"/>
+            </a:endParaRPr>
+          </a:p>
+        </p:txBody>
+      </p:sp>
+      <p:pic>
+        <p:nvPicPr>
+          <p:cNvPr id="9" name="Content Placeholder 8" descr="Diagram&#10;&#10;Description automatically generated">
+            <a:extLst>
+              <a:ext uri="{FF2B5EF4-FFF2-40B4-BE49-F238E27FC236}">
+                <a16:creationId xmlns:a16="http://schemas.microsoft.com/office/drawing/2014/main" id="{AA739B87-BEA0-4B72-A03D-061DA14D02CB}"/>
+              </a:ext>
+            </a:extLst>
+          </p:cNvPr>
+          <p:cNvPicPr>
+            <a:picLocks noGrp="1" noChangeAspect="1"/>
+          </p:cNvPicPr>
+          <p:nvPr>
+            <p:ph idx="1"/>
+          </p:nvPr>
+        </p:nvPicPr>
+        <p:blipFill>
+          <a:blip r:embed="rId2">
+            <a:extLst>
+              <a:ext uri="{28A0092B-C50C-407E-A947-70E740481C1C}">
+                <a14:useLocalDpi xmlns:a14="http://schemas.microsoft.com/office/drawing/2010/main" val="0"/>
+              </a:ext>
+            </a:extLst>
+          </a:blip>
+          <a:stretch>
+            <a:fillRect/>
+          </a:stretch>
+        </p:blipFill>
+        <p:spPr>
+          <a:xfrm>
+            <a:off x="534988" y="2777133"/>
+            <a:ext cx="6702425" cy="6183710"/>
+          </a:xfrm>
+        </p:spPr>
+      </p:pic>
+      <p:sp>
+        <p:nvSpPr>
+          <p:cNvPr id="11" name="TextBox 10">
+            <a:extLst>
+              <a:ext uri="{FF2B5EF4-FFF2-40B4-BE49-F238E27FC236}">
+                <a16:creationId xmlns:a16="http://schemas.microsoft.com/office/drawing/2014/main" id="{98DCAFED-C6A9-48A5-93C2-3B037E2E508F}"/>
+              </a:ext>
+            </a:extLst>
+          </p:cNvPr>
+          <p:cNvSpPr txBox="1"/>
+          <p:nvPr/>
+        </p:nvSpPr>
+        <p:spPr>
+          <a:xfrm>
+            <a:off x="5549900" y="4032250"/>
+            <a:ext cx="1631950" cy="3631763"/>
+          </a:xfrm>
+          <a:prstGeom prst="rect">
+            <a:avLst/>
+          </a:prstGeom>
+          <a:solidFill>
+            <a:srgbClr val="CCC5B8">
+              <a:alpha val="74902"/>
+            </a:srgbClr>
+          </a:solidFill>
+          <a:ln>
+            <a:solidFill>
+              <a:schemeClr val="tx1"/>
+            </a:solidFill>
+          </a:ln>
+        </p:spPr>
+        <p:txBody>
+          <a:bodyPr wrap="square" rtlCol="0">
+            <a:spAutoFit/>
+          </a:bodyPr>
+          <a:lstStyle/>
+          <a:p>
+            <a:pPr marL="228600" indent="-228600">
+              <a:buAutoNum type="alphaLcPeriod"/>
+            </a:pPr>
+            <a:r>
+              <a:rPr lang="en-US" sz="1200" dirty="0">
+                <a:latin typeface="Arial" panose="020B0604020202020204" pitchFamily="34" charset="0"/>
+                <a:cs typeface="Arial" panose="020B0604020202020204" pitchFamily="34" charset="0"/>
+              </a:rPr>
+              <a:t>Eterna Rd</a:t>
+            </a:r>
+            <a:r>
+              <a:rPr lang="en-US" sz="1400" dirty="0">
+                <a:latin typeface="Arial" panose="020B0604020202020204" pitchFamily="34" charset="0"/>
+                <a:cs typeface="Arial" panose="020B0604020202020204" pitchFamily="34" charset="0"/>
+              </a:rPr>
+              <a:t>.</a:t>
+            </a:r>
+            <a:endParaRPr lang="en-US" sz="1200" dirty="0">
+              <a:latin typeface="Arial" panose="020B0604020202020204" pitchFamily="34" charset="0"/>
+              <a:cs typeface="Arial" panose="020B0604020202020204" pitchFamily="34" charset="0"/>
+            </a:endParaRPr>
+          </a:p>
+          <a:p>
+            <a:pPr marL="228600" indent="-228600">
+              <a:buAutoNum type="alphaLcPeriod"/>
+            </a:pPr>
+            <a:r>
+              <a:rPr lang="en-US" sz="1200" dirty="0">
+                <a:latin typeface="Arial" panose="020B0604020202020204" pitchFamily="34" charset="0"/>
+                <a:cs typeface="Arial" panose="020B0604020202020204" pitchFamily="34" charset="0"/>
+              </a:rPr>
+              <a:t>Temple of Gond</a:t>
+            </a:r>
+          </a:p>
+          <a:p>
+            <a:pPr marL="228600" indent="-228600">
+              <a:buAutoNum type="alphaLcPeriod"/>
+            </a:pPr>
+            <a:r>
+              <a:rPr lang="en-US" sz="1200" dirty="0">
+                <a:latin typeface="Arial" panose="020B0604020202020204" pitchFamily="34" charset="0"/>
+                <a:cs typeface="Arial" panose="020B0604020202020204" pitchFamily="34" charset="0"/>
+              </a:rPr>
+              <a:t>The Innterna</a:t>
+            </a:r>
+          </a:p>
+          <a:p>
+            <a:pPr marL="228600" indent="-228600">
+              <a:buAutoNum type="alphaLcPeriod"/>
+            </a:pPr>
+            <a:r>
+              <a:rPr lang="en-US" sz="1200" dirty="0">
+                <a:latin typeface="Arial" panose="020B0604020202020204" pitchFamily="34" charset="0"/>
+                <a:cs typeface="Arial" panose="020B0604020202020204" pitchFamily="34" charset="0"/>
+              </a:rPr>
+              <a:t>Innterna Stables</a:t>
+            </a:r>
+          </a:p>
+          <a:p>
+            <a:pPr marL="228600" indent="-228600">
+              <a:buAutoNum type="alphaLcPeriod"/>
+            </a:pPr>
+            <a:r>
+              <a:rPr lang="en-US" sz="1200" dirty="0">
+                <a:latin typeface="Arial" panose="020B0604020202020204" pitchFamily="34" charset="0"/>
+                <a:cs typeface="Arial" panose="020B0604020202020204" pitchFamily="34" charset="0"/>
+              </a:rPr>
+              <a:t>The Corner Store</a:t>
+            </a:r>
+          </a:p>
+          <a:p>
+            <a:pPr marL="228600" indent="-228600">
+              <a:buAutoNum type="alphaLcPeriod"/>
+            </a:pPr>
+            <a:r>
+              <a:rPr lang="en-US" sz="1200" dirty="0">
+                <a:latin typeface="Arial" panose="020B0604020202020204" pitchFamily="34" charset="0"/>
+                <a:cs typeface="Arial" panose="020B0604020202020204" pitchFamily="34" charset="0"/>
+              </a:rPr>
+              <a:t>The Hot Hammer</a:t>
+            </a:r>
+          </a:p>
+          <a:p>
+            <a:pPr marL="228600" indent="-228600">
+              <a:buAutoNum type="alphaLcPeriod"/>
+            </a:pPr>
+            <a:r>
+              <a:rPr lang="en-US" sz="1200" dirty="0">
+                <a:latin typeface="Arial" panose="020B0604020202020204" pitchFamily="34" charset="0"/>
+                <a:cs typeface="Arial" panose="020B0604020202020204" pitchFamily="34" charset="0"/>
+              </a:rPr>
+              <a:t>Orebraid High</a:t>
+            </a:r>
+          </a:p>
+          <a:p>
+            <a:pPr marL="228600" indent="-228600">
+              <a:buAutoNum type="alphaLcPeriod"/>
+            </a:pPr>
+            <a:r>
+              <a:rPr lang="en-US" sz="1200" dirty="0">
+                <a:latin typeface="Arial" panose="020B0604020202020204" pitchFamily="34" charset="0"/>
+                <a:cs typeface="Arial" panose="020B0604020202020204" pitchFamily="34" charset="0"/>
+              </a:rPr>
+              <a:t>Orebraid Steel</a:t>
+            </a:r>
+          </a:p>
+          <a:p>
+            <a:pPr marL="228600" indent="-228600">
+              <a:buAutoNum type="alphaLcPeriod"/>
+            </a:pPr>
+            <a:r>
+              <a:rPr lang="en-US" sz="1200" dirty="0">
+                <a:latin typeface="Arial" panose="020B0604020202020204" pitchFamily="34" charset="0"/>
+                <a:cs typeface="Arial" panose="020B0604020202020204" pitchFamily="34" charset="0"/>
+              </a:rPr>
+              <a:t>The Oak</a:t>
+            </a:r>
+          </a:p>
+          <a:p>
+            <a:pPr marL="228600" indent="-228600">
+              <a:buAutoNum type="alphaLcPeriod"/>
+            </a:pPr>
+            <a:r>
+              <a:rPr lang="en-US" sz="1200" dirty="0">
+                <a:latin typeface="Arial" panose="020B0604020202020204" pitchFamily="34" charset="0"/>
+                <a:cs typeface="Arial" panose="020B0604020202020204" pitchFamily="34" charset="0"/>
+              </a:rPr>
+              <a:t>Orebraid Steel Coal Mine</a:t>
+            </a:r>
+          </a:p>
+          <a:p>
+            <a:pPr marL="228600" indent="-228600">
+              <a:buAutoNum type="alphaLcPeriod"/>
+            </a:pPr>
+            <a:r>
+              <a:rPr lang="en-US" sz="1200" dirty="0">
+                <a:latin typeface="Arial" panose="020B0604020202020204" pitchFamily="34" charset="0"/>
+                <a:cs typeface="Arial" panose="020B0604020202020204" pitchFamily="34" charset="0"/>
+              </a:rPr>
+              <a:t>Northwood Detention Center</a:t>
+            </a:r>
+          </a:p>
+          <a:p>
+            <a:pPr marL="228600" indent="-228600">
+              <a:buAutoNum type="alphaLcPeriod"/>
+            </a:pPr>
+            <a:r>
+              <a:rPr lang="en-US" sz="1200" dirty="0">
+                <a:latin typeface="Arial" panose="020B0604020202020204" pitchFamily="34" charset="0"/>
+                <a:cs typeface="Arial" panose="020B0604020202020204" pitchFamily="34" charset="0"/>
+              </a:rPr>
+              <a:t>Solace Spire</a:t>
+            </a:r>
+          </a:p>
+          <a:p>
+            <a:pPr marL="228600" indent="-228600">
+              <a:buAutoNum type="alphaLcPeriod"/>
+            </a:pPr>
+            <a:r>
+              <a:rPr lang="en-US" sz="1200" dirty="0">
+                <a:latin typeface="Arial" panose="020B0604020202020204" pitchFamily="34" charset="0"/>
+                <a:cs typeface="Arial" panose="020B0604020202020204" pitchFamily="34" charset="0"/>
+              </a:rPr>
+              <a:t>Town Hall</a:t>
+            </a:r>
+          </a:p>
+          <a:p>
+            <a:pPr marL="228600" indent="-228600">
+              <a:buAutoNum type="alphaLcPeriod"/>
+            </a:pPr>
+            <a:r>
+              <a:rPr lang="en-US" sz="1200" dirty="0">
+                <a:latin typeface="Arial" panose="020B0604020202020204" pitchFamily="34" charset="0"/>
+                <a:cs typeface="Arial" panose="020B0604020202020204" pitchFamily="34" charset="0"/>
+              </a:rPr>
+              <a:t>Cliffhammer House</a:t>
+            </a:r>
+          </a:p>
+          <a:p>
+            <a:pPr marL="228600" indent="-228600">
+              <a:buAutoNum type="alphaLcPeriod"/>
+            </a:pPr>
+            <a:r>
+              <a:rPr lang="en-US" sz="1200" dirty="0">
+                <a:latin typeface="Arial" panose="020B0604020202020204" pitchFamily="34" charset="0"/>
+                <a:cs typeface="Arial" panose="020B0604020202020204" pitchFamily="34" charset="0"/>
+              </a:rPr>
+              <a:t>The Dusty Tome</a:t>
+            </a:r>
+          </a:p>
+          <a:p>
+            <a:pPr marL="228600" indent="-228600">
+              <a:buAutoNum type="alphaLcPeriod"/>
+            </a:pPr>
+            <a:r>
+              <a:rPr lang="en-US" sz="1200" dirty="0">
+                <a:latin typeface="Arial" panose="020B0604020202020204" pitchFamily="34" charset="0"/>
+                <a:cs typeface="Arial" panose="020B0604020202020204" pitchFamily="34" charset="0"/>
+              </a:rPr>
+              <a:t>Eterna Forest</a:t>
+            </a:r>
+            <a:endParaRPr lang="en-US" sz="1100" dirty="0">
+              <a:latin typeface="Arial" panose="020B0604020202020204" pitchFamily="34" charset="0"/>
+              <a:cs typeface="Arial" panose="020B0604020202020204" pitchFamily="34" charset="0"/>
+            </a:endParaRPr>
+          </a:p>
+        </p:txBody>
+      </p:sp>
+    </p:spTree>
+    <p:extLst>
+      <p:ext uri="{BB962C8B-B14F-4D97-AF65-F5344CB8AC3E}">
+        <p14:creationId xmlns:p14="http://schemas.microsoft.com/office/powerpoint/2010/main" val="732754302"/>
+      </p:ext>
+    </p:extLst>
+  </p:cSld>
+  <p:clrMapOvr>
+    <a:masterClrMapping/>
+  </p:clrMapOvr>
+</p:sld>
+</file>
+
+<file path=ppt/slides/slide12.xml><?xml version="1.0" encoding="utf-8"?>
+<p:sld xmlns:a="http://schemas.openxmlformats.org/drawingml/2006/main" xmlns:r="http://schemas.openxmlformats.org/officeDocument/2006/relationships" xmlns:p="http://schemas.openxmlformats.org/presentationml/2006/main">
+  <p:cSld>
+    <p:spTree>
+      <p:nvGrpSpPr>
+        <p:cNvPr id="1" name=""/>
+        <p:cNvGrpSpPr/>
+        <p:nvPr/>
+      </p:nvGrpSpPr>
+      <p:grpSpPr>
+        <a:xfrm>
+          <a:off x="0" y="0"/>
+          <a:ext cx="0" cy="0"/>
+          <a:chOff x="0" y="0"/>
+          <a:chExt cx="0" cy="0"/>
+        </a:xfrm>
+      </p:grpSpPr>
+      <p:sp>
+        <p:nvSpPr>
+          <p:cNvPr id="2" name="Title 1">
+            <a:extLst>
+              <a:ext uri="{FF2B5EF4-FFF2-40B4-BE49-F238E27FC236}">
+                <a16:creationId xmlns:a16="http://schemas.microsoft.com/office/drawing/2014/main" id="{9B674860-A09C-456D-AF24-E3D7DE6D080A}"/>
+              </a:ext>
+            </a:extLst>
+          </p:cNvPr>
+          <p:cNvSpPr>
+            <a:spLocks noGrp="1"/>
+          </p:cNvSpPr>
+          <p:nvPr>
+            <p:ph type="title"/>
+          </p:nvPr>
+        </p:nvSpPr>
+        <p:spPr/>
+        <p:txBody>
+          <a:bodyPr>
+            <a:normAutofit/>
+          </a:bodyPr>
+          <a:lstStyle/>
+          <a:p>
+            <a:r>
+              <a:rPr lang="en-US" sz="4400" dirty="0">
+                <a:latin typeface="Papyrus" panose="03070502060502030205" pitchFamily="66" charset="0"/>
+              </a:rPr>
+              <a:t>Northwood - Overview</a:t>
+            </a:r>
+          </a:p>
+        </p:txBody>
+      </p:sp>
+      <p:sp>
+        <p:nvSpPr>
+          <p:cNvPr id="3" name="Content Placeholder 2">
+            <a:extLst>
+              <a:ext uri="{FF2B5EF4-FFF2-40B4-BE49-F238E27FC236}">
+                <a16:creationId xmlns:a16="http://schemas.microsoft.com/office/drawing/2014/main" id="{F059A770-66B2-4E0F-AD2D-7CF7229B5782}"/>
+              </a:ext>
+            </a:extLst>
+          </p:cNvPr>
+          <p:cNvSpPr>
+            <a:spLocks noGrp="1"/>
+          </p:cNvSpPr>
+          <p:nvPr>
+            <p:ph idx="1"/>
+          </p:nvPr>
+        </p:nvSpPr>
+        <p:spPr/>
+        <p:txBody>
+          <a:bodyPr>
+            <a:normAutofit/>
+          </a:bodyPr>
+          <a:lstStyle/>
+          <a:p>
+            <a:pPr marL="0" indent="0">
+              <a:lnSpc>
+                <a:spcPct val="150000"/>
+              </a:lnSpc>
+              <a:buNone/>
+            </a:pPr>
+            <a:r>
+              <a:rPr lang="en-US" sz="1400" b="1" dirty="0">
+                <a:latin typeface="Arial" panose="020B0604020202020204" pitchFamily="34" charset="0"/>
+                <a:cs typeface="Arial" panose="020B0604020202020204" pitchFamily="34" charset="0"/>
+              </a:rPr>
+              <a:t>Description:</a:t>
+            </a:r>
+            <a:r>
+              <a:rPr lang="en-US" sz="1400" dirty="0">
+                <a:latin typeface="Arial" panose="020B0604020202020204" pitchFamily="34" charset="0"/>
+                <a:cs typeface="Arial" panose="020B0604020202020204" pitchFamily="34" charset="0"/>
+              </a:rPr>
+              <a:t> As you make your way down the road, you hear church bells ring in the distance. Not too long after, you pass a bend in the road and see a small town nestled up to the forest. A stone temple with a single steeple dominates the area; people are just leaving the building as you set foot in the town borders.</a:t>
+            </a:r>
+          </a:p>
+          <a:p>
+            <a:pPr marL="0" indent="463550">
+              <a:lnSpc>
+                <a:spcPct val="150000"/>
+              </a:lnSpc>
+              <a:buNone/>
+            </a:pPr>
+            <a:r>
+              <a:rPr lang="en-US" sz="1400" dirty="0">
+                <a:latin typeface="Arial" panose="020B0604020202020204" pitchFamily="34" charset="0"/>
+                <a:cs typeface="Arial" panose="020B0604020202020204" pitchFamily="34" charset="0"/>
+              </a:rPr>
+              <a:t>Northwood is a small town 48 miles (2 days) north of Urtonburg. Northwood is situated directly next to Eterna Forest. The population will be determined as characters are made.</a:t>
+            </a:r>
+          </a:p>
+          <a:p>
+            <a:pPr marL="0" indent="463550">
+              <a:lnSpc>
+                <a:spcPct val="150000"/>
+              </a:lnSpc>
+              <a:buNone/>
+            </a:pPr>
+            <a:r>
+              <a:rPr lang="en-US" sz="1400" dirty="0">
+                <a:latin typeface="Arial" panose="020B0604020202020204" pitchFamily="34" charset="0"/>
+                <a:cs typeface="Arial" panose="020B0604020202020204" pitchFamily="34" charset="0"/>
+              </a:rPr>
+              <a:t>Northwood’s main objective as a town is to ferry the coal mined at the Orebraid Steel Coal Mine to Urtonburg. The town has only just begun to grow, and therefore the current mining situation is slow and inefficient.</a:t>
+            </a:r>
+          </a:p>
+        </p:txBody>
+      </p:sp>
+    </p:spTree>
+    <p:extLst>
+      <p:ext uri="{BB962C8B-B14F-4D97-AF65-F5344CB8AC3E}">
+        <p14:creationId xmlns:p14="http://schemas.microsoft.com/office/powerpoint/2010/main" val="1668281596"/>
+      </p:ext>
+    </p:extLst>
+  </p:cSld>
+  <p:clrMapOvr>
+    <a:masterClrMapping/>
+  </p:clrMapOvr>
+</p:sld>
+</file>
+
+<file path=ppt/slides/slide13.xml><?xml version="1.0" encoding="utf-8"?>
+<p:sld xmlns:a="http://schemas.openxmlformats.org/drawingml/2006/main" xmlns:r="http://schemas.openxmlformats.org/officeDocument/2006/relationships" xmlns:p="http://schemas.openxmlformats.org/presentationml/2006/main">
+  <p:cSld>
+    <p:spTree>
+      <p:nvGrpSpPr>
+        <p:cNvPr id="1" name=""/>
+        <p:cNvGrpSpPr/>
+        <p:nvPr/>
+      </p:nvGrpSpPr>
+      <p:grpSpPr>
+        <a:xfrm>
+          <a:off x="0" y="0"/>
+          <a:ext cx="0" cy="0"/>
+          <a:chOff x="0" y="0"/>
+          <a:chExt cx="0" cy="0"/>
+        </a:xfrm>
+      </p:grpSpPr>
+      <p:sp>
+        <p:nvSpPr>
+          <p:cNvPr id="2" name="Title 1">
+            <a:extLst>
+              <a:ext uri="{FF2B5EF4-FFF2-40B4-BE49-F238E27FC236}">
+                <a16:creationId xmlns:a16="http://schemas.microsoft.com/office/drawing/2014/main" id="{9B674860-A09C-456D-AF24-E3D7DE6D080A}"/>
+              </a:ext>
+            </a:extLst>
+          </p:cNvPr>
+          <p:cNvSpPr>
+            <a:spLocks noGrp="1"/>
+          </p:cNvSpPr>
+          <p:nvPr>
+            <p:ph type="title"/>
+          </p:nvPr>
+        </p:nvSpPr>
+        <p:spPr/>
+        <p:txBody>
+          <a:bodyPr>
+            <a:normAutofit/>
+          </a:bodyPr>
+          <a:lstStyle/>
+          <a:p>
+            <a:r>
+              <a:rPr lang="en-US" sz="4400" dirty="0">
+                <a:latin typeface="Papyrus" panose="03070502060502030205" pitchFamily="66" charset="0"/>
+              </a:rPr>
+              <a:t>Temple of Gond</a:t>
+            </a:r>
+          </a:p>
+        </p:txBody>
+      </p:sp>
+      <p:sp>
+        <p:nvSpPr>
+          <p:cNvPr id="3" name="Content Placeholder 2">
+            <a:extLst>
+              <a:ext uri="{FF2B5EF4-FFF2-40B4-BE49-F238E27FC236}">
+                <a16:creationId xmlns:a16="http://schemas.microsoft.com/office/drawing/2014/main" id="{F059A770-66B2-4E0F-AD2D-7CF7229B5782}"/>
+              </a:ext>
+            </a:extLst>
+          </p:cNvPr>
+          <p:cNvSpPr>
+            <a:spLocks noGrp="1"/>
+          </p:cNvSpPr>
+          <p:nvPr>
+            <p:ph idx="1"/>
+          </p:nvPr>
+        </p:nvSpPr>
+        <p:spPr/>
+        <p:txBody>
+          <a:bodyPr>
+            <a:normAutofit/>
+          </a:bodyPr>
+          <a:lstStyle/>
+          <a:p>
+            <a:pPr marL="0" indent="0">
+              <a:lnSpc>
+                <a:spcPct val="150000"/>
+              </a:lnSpc>
+              <a:buNone/>
+            </a:pPr>
+            <a:r>
+              <a:rPr lang="en-US" sz="1400" b="1" dirty="0">
+                <a:latin typeface="Arial" panose="020B0604020202020204" pitchFamily="34" charset="0"/>
+                <a:cs typeface="Arial" panose="020B0604020202020204" pitchFamily="34" charset="0"/>
+              </a:rPr>
+              <a:t>Description:</a:t>
+            </a:r>
+            <a:r>
+              <a:rPr lang="en-US" sz="1400" dirty="0">
+                <a:latin typeface="Arial" panose="020B0604020202020204" pitchFamily="34" charset="0"/>
+                <a:cs typeface="Arial" panose="020B0604020202020204" pitchFamily="34" charset="0"/>
+              </a:rPr>
+              <a:t> A large stone temple stands before you. The walls are a perfectly symmetrical array of polished granite bricks, smooth to the touch. Smooth marble steps lead you up to a large oak door with fine brass handles. An alabaster gear approximately 5ft. tall hangs over the door supported by 2 steel wires that reach up into the building. A single steeple reaches high into the sky with a large, shiny brass bell stored above.</a:t>
+            </a:r>
+          </a:p>
+          <a:p>
+            <a:pPr marL="0" indent="463550">
+              <a:lnSpc>
+                <a:spcPct val="150000"/>
+              </a:lnSpc>
+              <a:buNone/>
+            </a:pPr>
+            <a:r>
+              <a:rPr lang="en-US" sz="1400" b="1" dirty="0">
+                <a:latin typeface="Arial" panose="020B0604020202020204" pitchFamily="34" charset="0"/>
+                <a:cs typeface="Arial" panose="020B0604020202020204" pitchFamily="34" charset="0"/>
+              </a:rPr>
+              <a:t>Height:</a:t>
+            </a:r>
+            <a:r>
+              <a:rPr lang="en-US" sz="1400" dirty="0">
+                <a:latin typeface="Arial" panose="020B0604020202020204" pitchFamily="34" charset="0"/>
+                <a:cs typeface="Arial" panose="020B0604020202020204" pitchFamily="34" charset="0"/>
+              </a:rPr>
+              <a:t> 30ft. (Steeple is 50ft.)</a:t>
+            </a:r>
+          </a:p>
+          <a:p>
+            <a:pPr marL="0" indent="463550">
+              <a:lnSpc>
+                <a:spcPct val="150000"/>
+              </a:lnSpc>
+              <a:buNone/>
+            </a:pPr>
+            <a:r>
+              <a:rPr lang="en-US" sz="1400" b="1" dirty="0">
+                <a:latin typeface="Arial" panose="020B0604020202020204" pitchFamily="34" charset="0"/>
+                <a:cs typeface="Arial" panose="020B0604020202020204" pitchFamily="34" charset="0"/>
+              </a:rPr>
+              <a:t>Residents:</a:t>
+            </a:r>
+            <a:r>
+              <a:rPr lang="en-US" sz="1400" dirty="0">
+                <a:latin typeface="Arial" panose="020B0604020202020204" pitchFamily="34" charset="0"/>
+                <a:cs typeface="Arial" panose="020B0604020202020204" pitchFamily="34" charset="0"/>
+              </a:rPr>
+              <a:t> Father Lulmick, Durnurtha Brighthelm</a:t>
+            </a:r>
+          </a:p>
+          <a:p>
+            <a:pPr marL="0" indent="463550">
+              <a:lnSpc>
+                <a:spcPct val="150000"/>
+              </a:lnSpc>
+              <a:buNone/>
+            </a:pPr>
+            <a:r>
+              <a:rPr lang="en-US" sz="1400" b="1" dirty="0">
+                <a:latin typeface="Arial" panose="020B0604020202020204" pitchFamily="34" charset="0"/>
+                <a:cs typeface="Arial" panose="020B0604020202020204" pitchFamily="34" charset="0"/>
+              </a:rPr>
+              <a:t>DM Details:</a:t>
+            </a:r>
+            <a:r>
+              <a:rPr lang="en-US" sz="1400" dirty="0">
+                <a:latin typeface="Arial" panose="020B0604020202020204" pitchFamily="34" charset="0"/>
+                <a:cs typeface="Arial" panose="020B0604020202020204" pitchFamily="34" charset="0"/>
+              </a:rPr>
+              <a:t> </a:t>
+            </a:r>
+          </a:p>
+          <a:p>
+            <a:pPr marL="914400" indent="-193675">
+              <a:lnSpc>
+                <a:spcPct val="150000"/>
+              </a:lnSpc>
+            </a:pPr>
+            <a:r>
+              <a:rPr lang="en-US" sz="1400" dirty="0">
+                <a:latin typeface="Arial" panose="020B0604020202020204" pitchFamily="34" charset="0"/>
+                <a:cs typeface="Arial" panose="020B0604020202020204" pitchFamily="34" charset="0"/>
+              </a:rPr>
+              <a:t>DC 15 locks are used on all doors at night</a:t>
+            </a:r>
+          </a:p>
+          <a:p>
+            <a:pPr marL="914400" indent="-193675">
+              <a:lnSpc>
+                <a:spcPct val="150000"/>
+              </a:lnSpc>
+            </a:pPr>
+            <a:r>
+              <a:rPr lang="en-US" sz="1400" dirty="0">
+                <a:latin typeface="Arial" panose="020B0604020202020204" pitchFamily="34" charset="0"/>
+                <a:cs typeface="Arial" panose="020B0604020202020204" pitchFamily="34" charset="0"/>
+              </a:rPr>
+              <a:t>Mass is held every week </a:t>
+            </a:r>
+            <a:r>
+              <a:rPr lang="en-US" sz="1400" dirty="0">
+                <a:highlight>
+                  <a:srgbClr val="FF0000"/>
+                </a:highlight>
+                <a:latin typeface="Arial" panose="020B0604020202020204" pitchFamily="34" charset="0"/>
+                <a:cs typeface="Arial" panose="020B0604020202020204" pitchFamily="34" charset="0"/>
+              </a:rPr>
+              <a:t>[Make calendar]</a:t>
+            </a:r>
+          </a:p>
+          <a:p>
+            <a:pPr marL="914400" indent="-193675">
+              <a:lnSpc>
+                <a:spcPct val="150000"/>
+              </a:lnSpc>
+            </a:pPr>
+            <a:r>
+              <a:rPr lang="en-US" sz="1400" dirty="0">
+                <a:latin typeface="Arial" panose="020B0604020202020204" pitchFamily="34" charset="0"/>
+                <a:cs typeface="Arial" panose="020B0604020202020204" pitchFamily="34" charset="0"/>
+              </a:rPr>
+              <a:t>Lobby, West Wing, East Wing, Storage</a:t>
+            </a:r>
+          </a:p>
+        </p:txBody>
+      </p:sp>
+    </p:spTree>
+    <p:extLst>
+      <p:ext uri="{BB962C8B-B14F-4D97-AF65-F5344CB8AC3E}">
+        <p14:creationId xmlns:p14="http://schemas.microsoft.com/office/powerpoint/2010/main" val="1951259535"/>
+      </p:ext>
+    </p:extLst>
+  </p:cSld>
+  <p:clrMapOvr>
+    <a:masterClrMapping/>
+  </p:clrMapOvr>
+</p:sld>
+</file>
+
+<file path=ppt/slides/slide14.xml><?xml version="1.0" encoding="utf-8"?>
+<p:sld xmlns:a="http://schemas.openxmlformats.org/drawingml/2006/main" xmlns:r="http://schemas.openxmlformats.org/officeDocument/2006/relationships" xmlns:p="http://schemas.openxmlformats.org/presentationml/2006/main">
+  <p:cSld>
+    <p:spTree>
+      <p:nvGrpSpPr>
+        <p:cNvPr id="1" name=""/>
+        <p:cNvGrpSpPr/>
+        <p:nvPr/>
+      </p:nvGrpSpPr>
+      <p:grpSpPr>
+        <a:xfrm>
+          <a:off x="0" y="0"/>
+          <a:ext cx="0" cy="0"/>
+          <a:chOff x="0" y="0"/>
+          <a:chExt cx="0" cy="0"/>
+        </a:xfrm>
+      </p:grpSpPr>
+      <p:sp>
+        <p:nvSpPr>
+          <p:cNvPr id="2" name="Title 1">
+            <a:extLst>
+              <a:ext uri="{FF2B5EF4-FFF2-40B4-BE49-F238E27FC236}">
+                <a16:creationId xmlns:a16="http://schemas.microsoft.com/office/drawing/2014/main" id="{9B674860-A09C-456D-AF24-E3D7DE6D080A}"/>
+              </a:ext>
+            </a:extLst>
+          </p:cNvPr>
+          <p:cNvSpPr>
+            <a:spLocks noGrp="1"/>
+          </p:cNvSpPr>
+          <p:nvPr>
+            <p:ph type="title"/>
+          </p:nvPr>
+        </p:nvSpPr>
+        <p:spPr/>
+        <p:txBody>
+          <a:bodyPr>
+            <a:normAutofit/>
+          </a:bodyPr>
+          <a:lstStyle/>
+          <a:p>
+            <a:r>
+              <a:rPr lang="en-US" sz="4400" dirty="0">
+                <a:latin typeface="Papyrus" panose="03070502060502030205" pitchFamily="66" charset="0"/>
+              </a:rPr>
+              <a:t>Temple of Gond</a:t>
+            </a:r>
+          </a:p>
+        </p:txBody>
+      </p:sp>
+      <p:sp>
+        <p:nvSpPr>
+          <p:cNvPr id="3" name="Content Placeholder 2">
+            <a:extLst>
+              <a:ext uri="{FF2B5EF4-FFF2-40B4-BE49-F238E27FC236}">
+                <a16:creationId xmlns:a16="http://schemas.microsoft.com/office/drawing/2014/main" id="{F059A770-66B2-4E0F-AD2D-7CF7229B5782}"/>
+              </a:ext>
+            </a:extLst>
+          </p:cNvPr>
+          <p:cNvSpPr>
+            <a:spLocks noGrp="1"/>
+          </p:cNvSpPr>
+          <p:nvPr>
+            <p:ph idx="1"/>
+          </p:nvPr>
+        </p:nvSpPr>
+        <p:spPr/>
+        <p:txBody>
+          <a:bodyPr>
+            <a:normAutofit/>
+          </a:bodyPr>
+          <a:lstStyle/>
+          <a:p>
+            <a:pPr marL="0" indent="0">
+              <a:lnSpc>
+                <a:spcPct val="150000"/>
+              </a:lnSpc>
+              <a:buNone/>
+            </a:pPr>
+            <a:r>
+              <a:rPr lang="en-US" sz="1400" b="1" dirty="0">
+                <a:latin typeface="Arial" panose="020B0604020202020204" pitchFamily="34" charset="0"/>
+                <a:cs typeface="Arial" panose="020B0604020202020204" pitchFamily="34" charset="0"/>
+              </a:rPr>
+              <a:t>Description:</a:t>
+            </a:r>
+            <a:r>
+              <a:rPr lang="en-US" sz="1400" dirty="0">
+                <a:latin typeface="Arial" panose="020B0604020202020204" pitchFamily="34" charset="0"/>
+                <a:cs typeface="Arial" panose="020B0604020202020204" pitchFamily="34" charset="0"/>
+              </a:rPr>
+              <a:t> A large stone temple stands before you. The walls are a perfectly symmetrical array of polished granite bricks, smooth to the touch. Smooth marble steps lead you up to a large oak door with fine brass handles. An alabaster gear approximately 5ft. tall hangs over the door supported by 2 steel wires that reach up into the building. A single steeple reaches high into the sky with a large, shiny brass bell stored above.</a:t>
+            </a:r>
+          </a:p>
+          <a:p>
+            <a:pPr marL="0" indent="463550">
+              <a:lnSpc>
+                <a:spcPct val="150000"/>
+              </a:lnSpc>
+              <a:buNone/>
+            </a:pPr>
+            <a:r>
+              <a:rPr lang="en-US" sz="1400" b="1" dirty="0">
+                <a:latin typeface="Arial" panose="020B0604020202020204" pitchFamily="34" charset="0"/>
+                <a:cs typeface="Arial" panose="020B0604020202020204" pitchFamily="34" charset="0"/>
+              </a:rPr>
+              <a:t>Height:</a:t>
+            </a:r>
+            <a:r>
+              <a:rPr lang="en-US" sz="1400" dirty="0">
+                <a:latin typeface="Arial" panose="020B0604020202020204" pitchFamily="34" charset="0"/>
+                <a:cs typeface="Arial" panose="020B0604020202020204" pitchFamily="34" charset="0"/>
+              </a:rPr>
+              <a:t> 30ft. (Steeple is 50ft.)</a:t>
+            </a:r>
+          </a:p>
+          <a:p>
+            <a:pPr marL="0" indent="463550">
+              <a:lnSpc>
+                <a:spcPct val="150000"/>
+              </a:lnSpc>
+              <a:buNone/>
+            </a:pPr>
+            <a:r>
+              <a:rPr lang="en-US" sz="1400" b="1" dirty="0">
+                <a:latin typeface="Arial" panose="020B0604020202020204" pitchFamily="34" charset="0"/>
+                <a:cs typeface="Arial" panose="020B0604020202020204" pitchFamily="34" charset="0"/>
+              </a:rPr>
+              <a:t>Residents:</a:t>
+            </a:r>
+            <a:r>
+              <a:rPr lang="en-US" sz="1400" dirty="0">
+                <a:latin typeface="Arial" panose="020B0604020202020204" pitchFamily="34" charset="0"/>
+                <a:cs typeface="Arial" panose="020B0604020202020204" pitchFamily="34" charset="0"/>
+              </a:rPr>
+              <a:t> Father Lulmick, Durnurtha Brighthelm</a:t>
+            </a:r>
+          </a:p>
+          <a:p>
+            <a:pPr marL="0" indent="463550">
+              <a:lnSpc>
+                <a:spcPct val="150000"/>
+              </a:lnSpc>
+              <a:buNone/>
+            </a:pPr>
+            <a:r>
+              <a:rPr lang="en-US" sz="1400" b="1" dirty="0">
+                <a:latin typeface="Arial" panose="020B0604020202020204" pitchFamily="34" charset="0"/>
+                <a:cs typeface="Arial" panose="020B0604020202020204" pitchFamily="34" charset="0"/>
+              </a:rPr>
+              <a:t>DM Details:</a:t>
+            </a:r>
+            <a:r>
+              <a:rPr lang="en-US" sz="1400" dirty="0">
+                <a:latin typeface="Arial" panose="020B0604020202020204" pitchFamily="34" charset="0"/>
+                <a:cs typeface="Arial" panose="020B0604020202020204" pitchFamily="34" charset="0"/>
+              </a:rPr>
+              <a:t> </a:t>
+            </a:r>
+          </a:p>
+          <a:p>
+            <a:pPr marL="914400" indent="-193675">
+              <a:lnSpc>
+                <a:spcPct val="150000"/>
+              </a:lnSpc>
+            </a:pPr>
+            <a:r>
+              <a:rPr lang="en-US" sz="1400" dirty="0">
+                <a:latin typeface="Arial" panose="020B0604020202020204" pitchFamily="34" charset="0"/>
+                <a:cs typeface="Arial" panose="020B0604020202020204" pitchFamily="34" charset="0"/>
+              </a:rPr>
+              <a:t>DC 15 locks are used on all doors at night</a:t>
+            </a:r>
+          </a:p>
+          <a:p>
+            <a:pPr marL="914400" indent="-193675">
+              <a:lnSpc>
+                <a:spcPct val="150000"/>
+              </a:lnSpc>
+            </a:pPr>
+            <a:r>
+              <a:rPr lang="en-US" sz="1400" dirty="0">
+                <a:latin typeface="Arial" panose="020B0604020202020204" pitchFamily="34" charset="0"/>
+                <a:cs typeface="Arial" panose="020B0604020202020204" pitchFamily="34" charset="0"/>
+              </a:rPr>
+              <a:t>Mass is held every week </a:t>
+            </a:r>
+            <a:r>
+              <a:rPr lang="en-US" sz="1400" dirty="0">
+                <a:highlight>
+                  <a:srgbClr val="FF0000"/>
+                </a:highlight>
+                <a:latin typeface="Arial" panose="020B0604020202020204" pitchFamily="34" charset="0"/>
+                <a:cs typeface="Arial" panose="020B0604020202020204" pitchFamily="34" charset="0"/>
+              </a:rPr>
+              <a:t>[Make calendar]</a:t>
+            </a:r>
+          </a:p>
+          <a:p>
+            <a:pPr marL="914400" indent="-193675">
+              <a:lnSpc>
+                <a:spcPct val="150000"/>
+              </a:lnSpc>
+            </a:pPr>
+            <a:r>
+              <a:rPr lang="en-US" sz="1400" dirty="0">
+                <a:latin typeface="Arial" panose="020B0604020202020204" pitchFamily="34" charset="0"/>
+                <a:cs typeface="Arial" panose="020B0604020202020204" pitchFamily="34" charset="0"/>
+              </a:rPr>
+              <a:t>Lobby, West Wing, East Wing, Storage</a:t>
+            </a:r>
+          </a:p>
+          <a:p>
+            <a:pPr marL="914400" indent="-193675">
+              <a:lnSpc>
+                <a:spcPct val="150000"/>
+              </a:lnSpc>
+            </a:pPr>
+            <a:r>
+              <a:rPr lang="en-US" sz="1400" dirty="0">
+                <a:highlight>
+                  <a:srgbClr val="00FF00"/>
+                </a:highlight>
+                <a:latin typeface="Arial" panose="020B0604020202020204" pitchFamily="34" charset="0"/>
+                <a:cs typeface="Arial" panose="020B0604020202020204" pitchFamily="34" charset="0"/>
+              </a:rPr>
+              <a:t>Lulmick cleric, Dur Paladin, West Wing chapel, East Wing maker shop, Storage is 2</a:t>
+            </a:r>
+            <a:r>
+              <a:rPr lang="en-US" sz="1400" baseline="30000" dirty="0">
+                <a:highlight>
+                  <a:srgbClr val="00FF00"/>
+                </a:highlight>
+                <a:latin typeface="Arial" panose="020B0604020202020204" pitchFamily="34" charset="0"/>
+                <a:cs typeface="Arial" panose="020B0604020202020204" pitchFamily="34" charset="0"/>
+              </a:rPr>
+              <a:t>nd</a:t>
+            </a:r>
+            <a:r>
+              <a:rPr lang="en-US" sz="1400" dirty="0">
+                <a:highlight>
+                  <a:srgbClr val="00FF00"/>
+                </a:highlight>
+                <a:latin typeface="Arial" panose="020B0604020202020204" pitchFamily="34" charset="0"/>
+                <a:cs typeface="Arial" panose="020B0604020202020204" pitchFamily="34" charset="0"/>
+              </a:rPr>
+              <a:t> floor of lobby, Storage reaches to bell tower</a:t>
+            </a:r>
+          </a:p>
+        </p:txBody>
+      </p:sp>
+    </p:spTree>
+    <p:extLst>
+      <p:ext uri="{BB962C8B-B14F-4D97-AF65-F5344CB8AC3E}">
+        <p14:creationId xmlns:p14="http://schemas.microsoft.com/office/powerpoint/2010/main" val="1869157148"/>
+      </p:ext>
+    </p:extLst>
+  </p:cSld>
+  <p:clrMapOvr>
+    <a:masterClrMapping/>
+  </p:clrMapOvr>
+</p:sld>
+</file>
+
+<file path=ppt/slides/slide15.xml><?xml version="1.0" encoding="utf-8"?>
+<p:sld xmlns:a="http://schemas.openxmlformats.org/drawingml/2006/main" xmlns:r="http://schemas.openxmlformats.org/officeDocument/2006/relationships" xmlns:p="http://schemas.openxmlformats.org/presentationml/2006/main">
+  <p:cSld>
+    <p:spTree>
+      <p:nvGrpSpPr>
+        <p:cNvPr id="1" name=""/>
+        <p:cNvGrpSpPr/>
+        <p:nvPr/>
+      </p:nvGrpSpPr>
+      <p:grpSpPr>
+        <a:xfrm>
+          <a:off x="0" y="0"/>
+          <a:ext cx="0" cy="0"/>
+          <a:chOff x="0" y="0"/>
+          <a:chExt cx="0" cy="0"/>
+        </a:xfrm>
+      </p:grpSpPr>
+      <p:sp>
+        <p:nvSpPr>
+          <p:cNvPr id="2" name="Title 1">
+            <a:extLst>
+              <a:ext uri="{FF2B5EF4-FFF2-40B4-BE49-F238E27FC236}">
+                <a16:creationId xmlns:a16="http://schemas.microsoft.com/office/drawing/2014/main" id="{9B674860-A09C-456D-AF24-E3D7DE6D080A}"/>
+              </a:ext>
+            </a:extLst>
+          </p:cNvPr>
+          <p:cNvSpPr>
+            <a:spLocks noGrp="1"/>
+          </p:cNvSpPr>
+          <p:nvPr>
+            <p:ph type="title"/>
+          </p:nvPr>
+        </p:nvSpPr>
+        <p:spPr/>
+        <p:txBody>
+          <a:bodyPr>
+            <a:normAutofit/>
+          </a:bodyPr>
+          <a:lstStyle/>
+          <a:p>
+            <a:r>
               <a:rPr lang="en-US" sz="4400" dirty="0">
                 <a:latin typeface="Papyrus" panose="03070502060502030205" pitchFamily="66" charset="0"/>
               </a:rPr>

</xml_diff>

<commit_message>
Made Norman Orebraid a cloud giant. It fits so well it isn't funny.
</commit_message>
<xml_diff>
--- a/My Multiverse/The Jaws of Time.pptx
+++ b/My Multiverse/The Jaws of Time.pptx
@@ -257,7 +257,7 @@
           <a:p>
             <a:fld id="{05FE7FBA-F4D8-4820-972B-6B84E9A3DAEA}" type="datetimeFigureOut">
               <a:rPr lang="en-US" smtClean="0"/>
-              <a:t>5/9/2021</a:t>
+              <a:t>5/10/2021</a:t>
             </a:fld>
             <a:endParaRPr lang="en-US"/>
           </a:p>
@@ -427,7 +427,7 @@
           <a:p>
             <a:fld id="{05FE7FBA-F4D8-4820-972B-6B84E9A3DAEA}" type="datetimeFigureOut">
               <a:rPr lang="en-US" smtClean="0"/>
-              <a:t>5/9/2021</a:t>
+              <a:t>5/10/2021</a:t>
             </a:fld>
             <a:endParaRPr lang="en-US"/>
           </a:p>
@@ -607,7 +607,7 @@
           <a:p>
             <a:fld id="{05FE7FBA-F4D8-4820-972B-6B84E9A3DAEA}" type="datetimeFigureOut">
               <a:rPr lang="en-US" smtClean="0"/>
-              <a:t>5/9/2021</a:t>
+              <a:t>5/10/2021</a:t>
             </a:fld>
             <a:endParaRPr lang="en-US"/>
           </a:p>
@@ -777,7 +777,7 @@
           <a:p>
             <a:fld id="{05FE7FBA-F4D8-4820-972B-6B84E9A3DAEA}" type="datetimeFigureOut">
               <a:rPr lang="en-US" smtClean="0"/>
-              <a:t>5/9/2021</a:t>
+              <a:t>5/10/2021</a:t>
             </a:fld>
             <a:endParaRPr lang="en-US"/>
           </a:p>
@@ -1021,7 +1021,7 @@
           <a:p>
             <a:fld id="{05FE7FBA-F4D8-4820-972B-6B84E9A3DAEA}" type="datetimeFigureOut">
               <a:rPr lang="en-US" smtClean="0"/>
-              <a:t>5/9/2021</a:t>
+              <a:t>5/10/2021</a:t>
             </a:fld>
             <a:endParaRPr lang="en-US"/>
           </a:p>
@@ -1253,7 +1253,7 @@
           <a:p>
             <a:fld id="{05FE7FBA-F4D8-4820-972B-6B84E9A3DAEA}" type="datetimeFigureOut">
               <a:rPr lang="en-US" smtClean="0"/>
-              <a:t>5/9/2021</a:t>
+              <a:t>5/10/2021</a:t>
             </a:fld>
             <a:endParaRPr lang="en-US"/>
           </a:p>
@@ -1620,7 +1620,7 @@
           <a:p>
             <a:fld id="{05FE7FBA-F4D8-4820-972B-6B84E9A3DAEA}" type="datetimeFigureOut">
               <a:rPr lang="en-US" smtClean="0"/>
-              <a:t>5/9/2021</a:t>
+              <a:t>5/10/2021</a:t>
             </a:fld>
             <a:endParaRPr lang="en-US"/>
           </a:p>
@@ -1738,7 +1738,7 @@
           <a:p>
             <a:fld id="{05FE7FBA-F4D8-4820-972B-6B84E9A3DAEA}" type="datetimeFigureOut">
               <a:rPr lang="en-US" smtClean="0"/>
-              <a:t>5/9/2021</a:t>
+              <a:t>5/10/2021</a:t>
             </a:fld>
             <a:endParaRPr lang="en-US"/>
           </a:p>
@@ -1833,7 +1833,7 @@
           <a:p>
             <a:fld id="{05FE7FBA-F4D8-4820-972B-6B84E9A3DAEA}" type="datetimeFigureOut">
               <a:rPr lang="en-US" smtClean="0"/>
-              <a:t>5/9/2021</a:t>
+              <a:t>5/10/2021</a:t>
             </a:fld>
             <a:endParaRPr lang="en-US"/>
           </a:p>
@@ -2110,7 +2110,7 @@
           <a:p>
             <a:fld id="{05FE7FBA-F4D8-4820-972B-6B84E9A3DAEA}" type="datetimeFigureOut">
               <a:rPr lang="en-US" smtClean="0"/>
-              <a:t>5/9/2021</a:t>
+              <a:t>5/10/2021</a:t>
             </a:fld>
             <a:endParaRPr lang="en-US"/>
           </a:p>
@@ -2366,7 +2366,7 @@
           <a:p>
             <a:fld id="{05FE7FBA-F4D8-4820-972B-6B84E9A3DAEA}" type="datetimeFigureOut">
               <a:rPr lang="en-US" smtClean="0"/>
-              <a:t>5/9/2021</a:t>
+              <a:t>5/10/2021</a:t>
             </a:fld>
             <a:endParaRPr lang="en-US"/>
           </a:p>
@@ -2584,7 +2584,7 @@
           <a:p>
             <a:fld id="{05FE7FBA-F4D8-4820-972B-6B84E9A3DAEA}" type="datetimeFigureOut">
               <a:rPr lang="en-US" smtClean="0"/>
-              <a:t>5/9/2021</a:t>
+              <a:t>5/10/2021</a:t>
             </a:fld>
             <a:endParaRPr lang="en-US"/>
           </a:p>
@@ -4599,11 +4599,14 @@
           <a:lstStyle/>
           <a:p>
             <a:r>
-              <a:rPr lang="en-US" sz="4400">
+              <a:rPr lang="en-US" sz="4400" dirty="0" err="1">
                 <a:latin typeface="Papyrus" panose="03070502060502030205" pitchFamily="66" charset="0"/>
               </a:rPr>
               <a:t>Yultaria</a:t>
             </a:r>
+            <a:endParaRPr lang="en-US" sz="4400" dirty="0">
+              <a:latin typeface="Papyrus" panose="03070502060502030205" pitchFamily="66" charset="0"/>
+            </a:endParaRPr>
           </a:p>
         </p:txBody>
       </p:sp>
@@ -4698,7 +4701,7 @@
                 <a:latin typeface="Arial" panose="020B0604020202020204" pitchFamily="34" charset="0"/>
                 <a:cs typeface="Arial" panose="020B0604020202020204" pitchFamily="34" charset="0"/>
               </a:rPr>
-              <a:t>, the current owner, is a ruthless businessman, owning every mine on the Southeast coast. The capital of the steel world is near these mines in the </a:t>
+              <a:t> (a cloud giant), the current owner, is a ruthless businessman, owning every mine on the Southeast coast. The capital of the steel world is near these mines in the </a:t>
             </a:r>
             <a:r>
               <a:rPr lang="en-US" sz="1400" b="1" dirty="0">

</xml_diff>